<commit_message>
Update DATOS COVID Chile 2022 03 26.pptx
</commit_message>
<xml_diff>
--- a/DATOS COVID Chile 2022 03 26.pptx
+++ b/DATOS COVID Chile 2022 03 26.pptx
@@ -5598,10 +5598,10 @@
       </p:sp>
       <p:pic>
         <p:nvPicPr>
-          <p:cNvPr id="7" name="Picture 6" descr="Bar chart&#10;&#10;Description automatically generated with low confidence">
-            <a:extLst>
-              <a:ext uri="{FF2B5EF4-FFF2-40B4-BE49-F238E27FC236}">
-                <a16:creationId xmlns:a16="http://schemas.microsoft.com/office/drawing/2014/main" id="{3FB0123B-7A50-B64F-AD30-6194D54EC343}"/>
+          <p:cNvPr id="3" name="Picture 2">
+            <a:extLst>
+              <a:ext uri="{FF2B5EF4-FFF2-40B4-BE49-F238E27FC236}">
+                <a16:creationId xmlns:a16="http://schemas.microsoft.com/office/drawing/2014/main" id="{FC05395C-0674-434C-9F9A-B73D048C87F8}"/>
               </a:ext>
             </a:extLst>
           </p:cNvPr>
@@ -5618,8 +5618,8 @@
         </p:blipFill>
         <p:spPr>
           <a:xfrm>
-            <a:off x="512956" y="899494"/>
-            <a:ext cx="11679044" cy="5059012"/>
+            <a:off x="424841" y="890953"/>
+            <a:ext cx="11767159" cy="5393985"/>
           </a:xfrm>
           <a:prstGeom prst="rect">
             <a:avLst/>
@@ -5763,7 +5763,7 @@
                   <a:srgbClr val="FF0000"/>
                 </a:solidFill>
               </a:rPr>
-              <a:t>ALTO Y BAJANDO</a:t>
+              <a:t>BAJANDO</a:t>
             </a:r>
           </a:p>
         </p:txBody>
@@ -5858,7 +5858,7 @@
                   <a:srgbClr val="FF0000"/>
                 </a:solidFill>
               </a:rPr>
-              <a:t>ALTO Y BAJANDO</a:t>
+              <a:t>BAJANDO</a:t>
             </a:r>
             <a:endParaRPr lang="en-US" sz="2800" b="1" dirty="0">
               <a:solidFill>
@@ -5955,7 +5955,7 @@
 </file>
 
 <file path=ppt/slides/slide17.xml><?xml version="1.0" encoding="utf-8"?>
-<p:sld xmlns:a="http://schemas.openxmlformats.org/drawingml/2006/main" xmlns:r="http://schemas.openxmlformats.org/officeDocument/2006/relationships" xmlns:p="http://schemas.openxmlformats.org/presentationml/2006/main">
+<p:sld xmlns:a="http://schemas.openxmlformats.org/drawingml/2006/main" xmlns:r="http://schemas.openxmlformats.org/officeDocument/2006/relationships" xmlns:p="http://schemas.openxmlformats.org/presentationml/2006/main" show="0">
   <p:cSld>
     <p:spTree>
       <p:nvGrpSpPr>
@@ -6045,7 +6045,7 @@
 </file>
 
 <file path=ppt/slides/slide18.xml><?xml version="1.0" encoding="utf-8"?>
-<p:sld xmlns:a="http://schemas.openxmlformats.org/drawingml/2006/main" xmlns:r="http://schemas.openxmlformats.org/officeDocument/2006/relationships" xmlns:p="http://schemas.openxmlformats.org/presentationml/2006/main">
+<p:sld xmlns:a="http://schemas.openxmlformats.org/drawingml/2006/main" xmlns:r="http://schemas.openxmlformats.org/officeDocument/2006/relationships" xmlns:p="http://schemas.openxmlformats.org/presentationml/2006/main" show="0">
   <p:cSld>
     <p:spTree>
       <p:nvGrpSpPr>
@@ -6150,7 +6150,7 @@
 </file>
 
 <file path=ppt/slides/slide19.xml><?xml version="1.0" encoding="utf-8"?>
-<p:sld xmlns:a="http://schemas.openxmlformats.org/drawingml/2006/main" xmlns:r="http://schemas.openxmlformats.org/officeDocument/2006/relationships" xmlns:p="http://schemas.openxmlformats.org/presentationml/2006/main">
+<p:sld xmlns:a="http://schemas.openxmlformats.org/drawingml/2006/main" xmlns:r="http://schemas.openxmlformats.org/officeDocument/2006/relationships" xmlns:p="http://schemas.openxmlformats.org/presentationml/2006/main" show="0">
   <p:cSld>
     <p:spTree>
       <p:nvGrpSpPr>
@@ -6509,41 +6509,6 @@
       </p:sp>
       <p:sp>
         <p:nvSpPr>
-          <p:cNvPr id="11" name="TextBox 10">
-            <a:extLst>
-              <a:ext uri="{FF2B5EF4-FFF2-40B4-BE49-F238E27FC236}">
-                <a16:creationId xmlns:a16="http://schemas.microsoft.com/office/drawing/2014/main" id="{0148A4CA-3BDA-DF46-9B7F-0A23EBAA1D10}"/>
-              </a:ext>
-            </a:extLst>
-          </p:cNvPr>
-          <p:cNvSpPr txBox="1"/>
-          <p:nvPr/>
-        </p:nvSpPr>
-        <p:spPr>
-          <a:xfrm>
-            <a:off x="10236200" y="3995012"/>
-            <a:ext cx="237566" cy="369332"/>
-          </a:xfrm>
-          <a:prstGeom prst="rect">
-            <a:avLst/>
-          </a:prstGeom>
-          <a:noFill/>
-        </p:spPr>
-        <p:txBody>
-          <a:bodyPr wrap="none" rtlCol="0">
-            <a:spAutoFit/>
-          </a:bodyPr>
-          <a:lstStyle/>
-          <a:p>
-            <a:r>
-              <a:rPr lang="en-US" dirty="0"/>
-              <a:t> </a:t>
-            </a:r>
-          </a:p>
-        </p:txBody>
-      </p:sp>
-      <p:sp>
-        <p:nvSpPr>
           <p:cNvPr id="5" name="TextBox 4">
             <a:extLst>
               <a:ext uri="{FF2B5EF4-FFF2-40B4-BE49-F238E27FC236}">
@@ -6606,632 +6571,12 @@
           </a:p>
         </p:txBody>
       </p:sp>
-      <p:sp>
-        <p:nvSpPr>
-          <p:cNvPr id="6" name="Rectangle 5">
-            <a:extLst>
-              <a:ext uri="{FF2B5EF4-FFF2-40B4-BE49-F238E27FC236}">
-                <a16:creationId xmlns:a16="http://schemas.microsoft.com/office/drawing/2014/main" id="{C1CCC606-6B05-5849-BFD5-F45BFDEF4C82}"/>
-              </a:ext>
-            </a:extLst>
-          </p:cNvPr>
-          <p:cNvSpPr/>
-          <p:nvPr/>
-        </p:nvSpPr>
-        <p:spPr>
-          <a:xfrm>
-            <a:off x="7779802" y="1575265"/>
-            <a:ext cx="4224230" cy="3137210"/>
-          </a:xfrm>
-          <a:prstGeom prst="rect">
-            <a:avLst/>
-          </a:prstGeom>
-          <a:solidFill>
-            <a:schemeClr val="bg1">
-              <a:lumMod val="95000"/>
-            </a:schemeClr>
-          </a:solidFill>
-          <a:ln>
-            <a:solidFill>
-              <a:schemeClr val="tx1">
-                <a:lumMod val="50000"/>
-                <a:lumOff val="50000"/>
-              </a:schemeClr>
-            </a:solidFill>
-          </a:ln>
-        </p:spPr>
-        <p:style>
-          <a:lnRef idx="2">
-            <a:schemeClr val="accent1">
-              <a:shade val="50000"/>
-            </a:schemeClr>
-          </a:lnRef>
-          <a:fillRef idx="1">
-            <a:schemeClr val="accent1"/>
-          </a:fillRef>
-          <a:effectRef idx="0">
-            <a:schemeClr val="accent1"/>
-          </a:effectRef>
-          <a:fontRef idx="minor">
-            <a:schemeClr val="lt1"/>
-          </a:fontRef>
-        </p:style>
-        <p:txBody>
-          <a:bodyPr rtlCol="0" anchor="ctr"/>
-          <a:lstStyle/>
-          <a:p>
-            <a:pPr algn="ctr"/>
-            <a:endParaRPr lang="en-US"/>
-          </a:p>
-        </p:txBody>
-      </p:sp>
-      <p:sp>
-        <p:nvSpPr>
-          <p:cNvPr id="7" name="TextBox 6">
-            <a:extLst>
-              <a:ext uri="{FF2B5EF4-FFF2-40B4-BE49-F238E27FC236}">
-                <a16:creationId xmlns:a16="http://schemas.microsoft.com/office/drawing/2014/main" id="{C4202F18-A342-DE45-8808-8BF22A4A9C03}"/>
-              </a:ext>
-            </a:extLst>
-          </p:cNvPr>
-          <p:cNvSpPr txBox="1"/>
-          <p:nvPr/>
-        </p:nvSpPr>
-        <p:spPr>
-          <a:xfrm>
-            <a:off x="10425032" y="4009526"/>
-            <a:ext cx="237566" cy="369332"/>
-          </a:xfrm>
-          <a:prstGeom prst="rect">
-            <a:avLst/>
-          </a:prstGeom>
-          <a:noFill/>
-        </p:spPr>
-        <p:txBody>
-          <a:bodyPr wrap="none" rtlCol="0">
-            <a:spAutoFit/>
-          </a:bodyPr>
-          <a:lstStyle/>
-          <a:p>
-            <a:r>
-              <a:rPr lang="en-US" dirty="0"/>
-              <a:t> </a:t>
-            </a:r>
-          </a:p>
-        </p:txBody>
-      </p:sp>
-      <p:sp>
-        <p:nvSpPr>
-          <p:cNvPr id="8" name="TextBox 7">
-            <a:extLst>
-              <a:ext uri="{FF2B5EF4-FFF2-40B4-BE49-F238E27FC236}">
-                <a16:creationId xmlns:a16="http://schemas.microsoft.com/office/drawing/2014/main" id="{22707165-419C-004E-BEB8-2A0CB9DD64FF}"/>
-              </a:ext>
-            </a:extLst>
-          </p:cNvPr>
-          <p:cNvSpPr txBox="1"/>
-          <p:nvPr/>
-        </p:nvSpPr>
-        <p:spPr>
-          <a:xfrm>
-            <a:off x="8605347" y="1560751"/>
-            <a:ext cx="2573140" cy="584775"/>
-          </a:xfrm>
-          <a:prstGeom prst="rect">
-            <a:avLst/>
-          </a:prstGeom>
-          <a:noFill/>
-        </p:spPr>
-        <p:txBody>
-          <a:bodyPr wrap="none" rtlCol="0">
-            <a:spAutoFit/>
-          </a:bodyPr>
-          <a:lstStyle/>
-          <a:p>
-            <a:r>
-              <a:rPr lang="en-US" sz="3200" dirty="0"/>
-              <a:t>18 o </a:t>
-            </a:r>
-            <a:r>
-              <a:rPr lang="en-US" sz="3200" dirty="0" err="1"/>
-              <a:t>más</a:t>
-            </a:r>
-            <a:r>
-              <a:rPr lang="en-US" sz="3200" dirty="0"/>
-              <a:t> </a:t>
-            </a:r>
-            <a:r>
-              <a:rPr lang="en-US" sz="3200" dirty="0" err="1"/>
-              <a:t>años</a:t>
-            </a:r>
-            <a:endParaRPr lang="en-US" sz="3200" dirty="0"/>
-          </a:p>
-        </p:txBody>
-      </p:sp>
-      <p:graphicFrame>
-        <p:nvGraphicFramePr>
-          <p:cNvPr id="10" name="Table 16">
-            <a:extLst>
-              <a:ext uri="{FF2B5EF4-FFF2-40B4-BE49-F238E27FC236}">
-                <a16:creationId xmlns:a16="http://schemas.microsoft.com/office/drawing/2014/main" id="{4BA4A394-CE52-0C46-8327-FB25FE62DAED}"/>
-              </a:ext>
-            </a:extLst>
-          </p:cNvPr>
-          <p:cNvGraphicFramePr>
-            <a:graphicFrameLocks noGrp="1"/>
-          </p:cNvGraphicFramePr>
-          <p:nvPr>
-            <p:extLst>
-              <p:ext uri="{D42A27DB-BD31-4B8C-83A1-F6EECF244321}">
-                <p14:modId xmlns:p14="http://schemas.microsoft.com/office/powerpoint/2010/main" val="2522567138"/>
-              </p:ext>
-            </p:extLst>
-          </p:nvPr>
-        </p:nvGraphicFramePr>
-        <p:xfrm>
-          <a:off x="7802502" y="2367178"/>
-          <a:ext cx="4282139" cy="2194560"/>
-        </p:xfrm>
-        <a:graphic>
-          <a:graphicData uri="http://schemas.openxmlformats.org/drawingml/2006/table">
-            <a:tbl>
-              <a:tblPr>
-                <a:tableStyleId>{5C22544A-7EE6-4342-B048-85BDC9FD1C3A}</a:tableStyleId>
-              </a:tblPr>
-              <a:tblGrid>
-                <a:gridCol w="2008569">
-                  <a:extLst>
-                    <a:ext uri="{9D8B030D-6E8A-4147-A177-3AD203B41FA5}">
-                      <a16:colId xmlns:a16="http://schemas.microsoft.com/office/drawing/2014/main" val="1868078128"/>
-                    </a:ext>
-                  </a:extLst>
-                </a:gridCol>
-                <a:gridCol w="2273570">
-                  <a:extLst>
-                    <a:ext uri="{9D8B030D-6E8A-4147-A177-3AD203B41FA5}">
-                      <a16:colId xmlns:a16="http://schemas.microsoft.com/office/drawing/2014/main" val="1432861678"/>
-                    </a:ext>
-                  </a:extLst>
-                </a:gridCol>
-              </a:tblGrid>
-              <a:tr h="370840">
-                <a:tc>
-                  <a:txBody>
-                    <a:bodyPr/>
-                    <a:lstStyle/>
-                    <a:p>
-                      <a:r>
-                        <a:rPr lang="en-US" dirty="0" err="1"/>
-                        <a:t>Esquema</a:t>
-                      </a:r>
-                      <a:r>
-                        <a:rPr lang="en-US" dirty="0"/>
-                        <a:t> </a:t>
-                      </a:r>
-                      <a:r>
-                        <a:rPr lang="en-US" dirty="0" err="1"/>
-                        <a:t>primario</a:t>
-                      </a:r>
-                      <a:r>
-                        <a:rPr lang="en-US" dirty="0"/>
-                        <a:t> no </a:t>
-                      </a:r>
-                      <a:r>
-                        <a:rPr lang="en-US" dirty="0" err="1"/>
-                        <a:t>completo</a:t>
-                      </a:r>
-                      <a:endParaRPr lang="en-US" dirty="0"/>
-                    </a:p>
-                  </a:txBody>
-                  <a:tcPr>
-                    <a:lnL w="12700" cmpd="sng">
-                      <a:noFill/>
-                    </a:lnL>
-                    <a:lnR w="12700" cmpd="sng">
-                      <a:noFill/>
-                    </a:lnR>
-                    <a:lnT w="12700" cmpd="sng">
-                      <a:noFill/>
-                    </a:lnT>
-                    <a:lnB w="12700" cmpd="sng">
-                      <a:noFill/>
-                    </a:lnB>
-                    <a:lnTlToBr w="12700" cmpd="sng">
-                      <a:noFill/>
-                      <a:prstDash val="solid"/>
-                    </a:lnTlToBr>
-                    <a:lnBlToTr w="12700" cmpd="sng">
-                      <a:noFill/>
-                      <a:prstDash val="solid"/>
-                    </a:lnBlToTr>
-                    <a:noFill/>
-                  </a:tcPr>
-                </a:tc>
-                <a:tc>
-                  <a:txBody>
-                    <a:bodyPr/>
-                    <a:lstStyle/>
-                    <a:p>
-                      <a:pPr marL="0" marR="0" lvl="0" indent="0" algn="l" defTabSz="914400" rtl="0" eaLnBrk="1" fontAlgn="auto" latinLnBrk="0" hangingPunct="1">
-                        <a:lnSpc>
-                          <a:spcPct val="100000"/>
-                        </a:lnSpc>
-                        <a:spcBef>
-                          <a:spcPts val="0"/>
-                        </a:spcBef>
-                        <a:spcAft>
-                          <a:spcPts val="0"/>
-                        </a:spcAft>
-                        <a:buClrTx/>
-                        <a:buSzTx/>
-                        <a:buFontTx/>
-                        <a:buNone/>
-                        <a:tabLst/>
-                        <a:defRPr/>
-                      </a:pPr>
-                      <a:r>
-                        <a:rPr lang="en-US" sz="2400" b="1" dirty="0">
-                          <a:solidFill>
-                            <a:srgbClr val="FF0000"/>
-                          </a:solidFill>
-                        </a:rPr>
-                        <a:t>≈ 995 mil</a:t>
-                      </a:r>
-                    </a:p>
-                  </a:txBody>
-                  <a:tcPr>
-                    <a:lnL w="12700" cmpd="sng">
-                      <a:noFill/>
-                    </a:lnL>
-                    <a:lnR w="12700" cmpd="sng">
-                      <a:noFill/>
-                    </a:lnR>
-                    <a:lnT w="12700" cmpd="sng">
-                      <a:noFill/>
-                    </a:lnT>
-                    <a:lnB w="12700" cmpd="sng">
-                      <a:noFill/>
-                    </a:lnB>
-                    <a:lnTlToBr w="12700" cmpd="sng">
-                      <a:noFill/>
-                      <a:prstDash val="solid"/>
-                    </a:lnTlToBr>
-                    <a:lnBlToTr w="12700" cmpd="sng">
-                      <a:noFill/>
-                      <a:prstDash val="solid"/>
-                    </a:lnBlToTr>
-                    <a:noFill/>
-                  </a:tcPr>
-                </a:tc>
-                <a:extLst>
-                  <a:ext uri="{0D108BD9-81ED-4DB2-BD59-A6C34878D82A}">
-                    <a16:rowId xmlns:a16="http://schemas.microsoft.com/office/drawing/2014/main" val="3958812178"/>
-                  </a:ext>
-                </a:extLst>
-              </a:tr>
-              <a:tr h="370840">
-                <a:tc>
-                  <a:txBody>
-                    <a:bodyPr/>
-                    <a:lstStyle/>
-                    <a:p>
-                      <a:r>
-                        <a:rPr lang="en-US" dirty="0" err="1"/>
-                        <a:t>Esquema</a:t>
-                      </a:r>
-                      <a:r>
-                        <a:rPr lang="en-US" dirty="0"/>
-                        <a:t> </a:t>
-                      </a:r>
-                      <a:r>
-                        <a:rPr lang="en-US" dirty="0" err="1"/>
-                        <a:t>primario</a:t>
-                      </a:r>
-                      <a:r>
-                        <a:rPr lang="en-US" dirty="0"/>
-                        <a:t> sin </a:t>
-                      </a:r>
-                      <a:r>
-                        <a:rPr lang="en-US" dirty="0" err="1"/>
-                        <a:t>refuerzo</a:t>
-                      </a:r>
-                      <a:endParaRPr lang="en-US" dirty="0"/>
-                    </a:p>
-                  </a:txBody>
-                  <a:tcPr>
-                    <a:lnL w="12700" cmpd="sng">
-                      <a:noFill/>
-                    </a:lnL>
-                    <a:lnR w="12700" cmpd="sng">
-                      <a:noFill/>
-                    </a:lnR>
-                    <a:lnT w="12700" cmpd="sng">
-                      <a:noFill/>
-                    </a:lnT>
-                    <a:lnB w="12700" cmpd="sng">
-                      <a:noFill/>
-                    </a:lnB>
-                    <a:lnTlToBr w="12700" cmpd="sng">
-                      <a:noFill/>
-                      <a:prstDash val="solid"/>
-                    </a:lnTlToBr>
-                    <a:lnBlToTr w="12700" cmpd="sng">
-                      <a:noFill/>
-                      <a:prstDash val="solid"/>
-                    </a:lnBlToTr>
-                    <a:noFill/>
-                  </a:tcPr>
-                </a:tc>
-                <a:tc>
-                  <a:txBody>
-                    <a:bodyPr/>
-                    <a:lstStyle/>
-                    <a:p>
-                      <a:r>
-                        <a:rPr lang="en-US" sz="2400" b="1" dirty="0">
-                          <a:solidFill>
-                            <a:srgbClr val="FF0000"/>
-                          </a:solidFill>
-                        </a:rPr>
-                        <a:t>≈ 1,67 </a:t>
-                      </a:r>
-                      <a:r>
-                        <a:rPr lang="en-US" sz="2400" b="1" dirty="0" err="1">
-                          <a:solidFill>
-                            <a:srgbClr val="FF0000"/>
-                          </a:solidFill>
-                        </a:rPr>
-                        <a:t>millones</a:t>
-                      </a:r>
-                      <a:endParaRPr lang="en-US" sz="2400" b="1" dirty="0">
-                        <a:solidFill>
-                          <a:srgbClr val="FF0000"/>
-                        </a:solidFill>
-                      </a:endParaRPr>
-                    </a:p>
-                  </a:txBody>
-                  <a:tcPr>
-                    <a:lnL w="12700" cmpd="sng">
-                      <a:noFill/>
-                    </a:lnL>
-                    <a:lnR w="12700" cmpd="sng">
-                      <a:noFill/>
-                    </a:lnR>
-                    <a:lnT w="12700" cmpd="sng">
-                      <a:noFill/>
-                    </a:lnT>
-                    <a:lnB w="12700" cmpd="sng">
-                      <a:noFill/>
-                    </a:lnB>
-                    <a:lnTlToBr w="12700" cmpd="sng">
-                      <a:noFill/>
-                      <a:prstDash val="solid"/>
-                    </a:lnTlToBr>
-                    <a:lnBlToTr w="12700" cmpd="sng">
-                      <a:noFill/>
-                      <a:prstDash val="solid"/>
-                    </a:lnBlToTr>
-                    <a:noFill/>
-                  </a:tcPr>
-                </a:tc>
-                <a:extLst>
-                  <a:ext uri="{0D108BD9-81ED-4DB2-BD59-A6C34878D82A}">
-                    <a16:rowId xmlns:a16="http://schemas.microsoft.com/office/drawing/2014/main" val="508709535"/>
-                  </a:ext>
-                </a:extLst>
-              </a:tr>
-              <a:tr h="370840">
-                <a:tc>
-                  <a:txBody>
-                    <a:bodyPr/>
-                    <a:lstStyle/>
-                    <a:p>
-                      <a:r>
-                        <a:rPr lang="en-US" dirty="0" err="1"/>
-                        <a:t>Refuerzo</a:t>
-                      </a:r>
-                      <a:r>
-                        <a:rPr lang="en-US" dirty="0"/>
-                        <a:t> o 4ª </a:t>
-                      </a:r>
-                      <a:r>
-                        <a:rPr lang="en-US" dirty="0" err="1"/>
-                        <a:t>dosis</a:t>
-                      </a:r>
-                      <a:endParaRPr lang="en-US" dirty="0"/>
-                    </a:p>
-                  </a:txBody>
-                  <a:tcPr>
-                    <a:lnL w="12700" cmpd="sng">
-                      <a:noFill/>
-                    </a:lnL>
-                    <a:lnR w="12700" cmpd="sng">
-                      <a:noFill/>
-                    </a:lnR>
-                    <a:lnT w="12700" cmpd="sng">
-                      <a:noFill/>
-                    </a:lnT>
-                    <a:lnB w="12700" cmpd="sng">
-                      <a:noFill/>
-                    </a:lnB>
-                    <a:lnTlToBr w="12700" cmpd="sng">
-                      <a:noFill/>
-                      <a:prstDash val="solid"/>
-                    </a:lnTlToBr>
-                    <a:lnBlToTr w="12700" cmpd="sng">
-                      <a:noFill/>
-                      <a:prstDash val="solid"/>
-                    </a:lnBlToTr>
-                    <a:noFill/>
-                  </a:tcPr>
-                </a:tc>
-                <a:tc>
-                  <a:txBody>
-                    <a:bodyPr/>
-                    <a:lstStyle/>
-                    <a:p>
-                      <a:r>
-                        <a:rPr lang="en-US" sz="2400" b="1" dirty="0">
-                          <a:solidFill>
-                            <a:srgbClr val="FF0000"/>
-                          </a:solidFill>
-                        </a:rPr>
-                        <a:t>&gt; 12,5 </a:t>
-                      </a:r>
-                      <a:r>
-                        <a:rPr lang="en-US" sz="2400" b="1" dirty="0" err="1">
-                          <a:solidFill>
-                            <a:srgbClr val="FF0000"/>
-                          </a:solidFill>
-                        </a:rPr>
-                        <a:t>millones</a:t>
-                      </a:r>
-                      <a:endParaRPr lang="en-US" sz="2400" b="1" dirty="0">
-                        <a:solidFill>
-                          <a:srgbClr val="FF0000"/>
-                        </a:solidFill>
-                      </a:endParaRPr>
-                    </a:p>
-                  </a:txBody>
-                  <a:tcPr>
-                    <a:lnL w="12700" cmpd="sng">
-                      <a:noFill/>
-                    </a:lnL>
-                    <a:lnR w="12700" cmpd="sng">
-                      <a:noFill/>
-                    </a:lnR>
-                    <a:lnT w="12700" cmpd="sng">
-                      <a:noFill/>
-                    </a:lnT>
-                    <a:lnB w="12700" cmpd="sng">
-                      <a:noFill/>
-                    </a:lnB>
-                    <a:lnTlToBr w="12700" cmpd="sng">
-                      <a:noFill/>
-                      <a:prstDash val="solid"/>
-                    </a:lnTlToBr>
-                    <a:lnBlToTr w="12700" cmpd="sng">
-                      <a:noFill/>
-                      <a:prstDash val="solid"/>
-                    </a:lnBlToTr>
-                    <a:noFill/>
-                  </a:tcPr>
-                </a:tc>
-                <a:extLst>
-                  <a:ext uri="{0D108BD9-81ED-4DB2-BD59-A6C34878D82A}">
-                    <a16:rowId xmlns:a16="http://schemas.microsoft.com/office/drawing/2014/main" val="136128101"/>
-                  </a:ext>
-                </a:extLst>
-              </a:tr>
-              <a:tr h="370840">
-                <a:tc>
-                  <a:txBody>
-                    <a:bodyPr/>
-                    <a:lstStyle/>
-                    <a:p>
-                      <a:r>
-                        <a:rPr lang="en-US" dirty="0"/>
-                        <a:t>4ª </a:t>
-                      </a:r>
-                      <a:r>
-                        <a:rPr lang="en-US" dirty="0" err="1"/>
-                        <a:t>dosis</a:t>
-                      </a:r>
-                      <a:endParaRPr lang="en-US" dirty="0"/>
-                    </a:p>
-                  </a:txBody>
-                  <a:tcPr>
-                    <a:lnL w="12700" cmpd="sng">
-                      <a:noFill/>
-                    </a:lnL>
-                    <a:lnR w="12700" cmpd="sng">
-                      <a:noFill/>
-                    </a:lnR>
-                    <a:lnT w="12700" cmpd="sng">
-                      <a:noFill/>
-                    </a:lnT>
-                    <a:lnB w="12700" cmpd="sng">
-                      <a:noFill/>
-                    </a:lnB>
-                    <a:lnTlToBr w="12700" cmpd="sng">
-                      <a:noFill/>
-                      <a:prstDash val="solid"/>
-                    </a:lnTlToBr>
-                    <a:lnBlToTr w="12700" cmpd="sng">
-                      <a:noFill/>
-                      <a:prstDash val="solid"/>
-                    </a:lnBlToTr>
-                    <a:noFill/>
-                  </a:tcPr>
-                </a:tc>
-                <a:tc>
-                  <a:txBody>
-                    <a:bodyPr/>
-                    <a:lstStyle/>
-                    <a:p>
-                      <a:r>
-                        <a:rPr lang="en-US" sz="2400" b="1" dirty="0">
-                          <a:solidFill>
-                            <a:srgbClr val="FF0000"/>
-                          </a:solidFill>
-                        </a:rPr>
-                        <a:t>&gt; 2,2 </a:t>
-                      </a:r>
-                      <a:r>
-                        <a:rPr lang="en-US" sz="2400" b="1" dirty="0" err="1">
-                          <a:solidFill>
-                            <a:srgbClr val="FF0000"/>
-                          </a:solidFill>
-                        </a:rPr>
-                        <a:t>Millones</a:t>
-                      </a:r>
-                      <a:endParaRPr lang="en-US" sz="2400" b="1" dirty="0">
-                        <a:solidFill>
-                          <a:srgbClr val="FF0000"/>
-                        </a:solidFill>
-                      </a:endParaRPr>
-                    </a:p>
-                  </a:txBody>
-                  <a:tcPr>
-                    <a:lnL w="12700" cmpd="sng">
-                      <a:noFill/>
-                    </a:lnL>
-                    <a:lnR w="12700" cmpd="sng">
-                      <a:noFill/>
-                    </a:lnR>
-                    <a:lnT w="12700" cmpd="sng">
-                      <a:noFill/>
-                    </a:lnT>
-                    <a:lnB w="12700" cmpd="sng">
-                      <a:noFill/>
-                    </a:lnB>
-                    <a:lnTlToBr w="12700" cmpd="sng">
-                      <a:noFill/>
-                      <a:prstDash val="solid"/>
-                    </a:lnTlToBr>
-                    <a:lnBlToTr w="12700" cmpd="sng">
-                      <a:noFill/>
-                      <a:prstDash val="solid"/>
-                    </a:lnBlToTr>
-                    <a:noFill/>
-                  </a:tcPr>
-                </a:tc>
-                <a:extLst>
-                  <a:ext uri="{0D108BD9-81ED-4DB2-BD59-A6C34878D82A}">
-                    <a16:rowId xmlns:a16="http://schemas.microsoft.com/office/drawing/2014/main" val="3117557642"/>
-                  </a:ext>
-                </a:extLst>
-              </a:tr>
-            </a:tbl>
-          </a:graphicData>
-        </a:graphic>
-      </p:graphicFrame>
       <p:pic>
         <p:nvPicPr>
-          <p:cNvPr id="2" name="Picture 1">
-            <a:extLst>
-              <a:ext uri="{FF2B5EF4-FFF2-40B4-BE49-F238E27FC236}">
-                <a16:creationId xmlns:a16="http://schemas.microsoft.com/office/drawing/2014/main" id="{4328EF60-079C-C140-8E3E-B8558363D0B8}"/>
+          <p:cNvPr id="12" name="Picture 11">
+            <a:extLst>
+              <a:ext uri="{FF2B5EF4-FFF2-40B4-BE49-F238E27FC236}">
+                <a16:creationId xmlns:a16="http://schemas.microsoft.com/office/drawing/2014/main" id="{DFA4A5DE-6C86-AE4E-8F3B-B584278C1122}"/>
               </a:ext>
             </a:extLst>
           </p:cNvPr>
@@ -7248,8 +6593,8 @@
         </p:blipFill>
         <p:spPr>
           <a:xfrm>
-            <a:off x="107359" y="852121"/>
-            <a:ext cx="7569078" cy="5392562"/>
+            <a:off x="0" y="494847"/>
+            <a:ext cx="12192000" cy="5868306"/>
           </a:xfrm>
           <a:prstGeom prst="rect">
             <a:avLst/>

</xml_diff>